<commit_message>
updates to the slide
</commit_message>
<xml_diff>
--- a/csharp_application_with_entity_framework.pptx
+++ b/csharp_application_with_entity_framework.pptx
@@ -12,6 +12,9 @@
     <p:sldId id="259" r:id="rId7"/>
     <p:sldId id="260" r:id="rId8"/>
     <p:sldId id="261" r:id="rId9"/>
+    <p:sldId id="262" r:id="rId10"/>
+    <p:sldId id="263" r:id="rId11"/>
+    <p:sldId id="264" r:id="rId12"/>
   </p:sldIdLst>
   <p:sldSz cx="10080625" cy="7559675"/>
   <p:notesSz cx="7559675" cy="10691812"/>
@@ -69,8 +72,8 @@
         </p:nvSpPr>
         <p:spPr>
           <a:xfrm>
-            <a:off x="504000" y="304920"/>
-            <a:ext cx="7199640" cy="1262160"/>
+            <a:off x="504000" y="301320"/>
+            <a:ext cx="9072000" cy="1261800"/>
           </a:xfrm>
           <a:prstGeom prst="rect">
             <a:avLst/>
@@ -100,8 +103,8 @@
         </p:nvSpPr>
         <p:spPr>
           <a:xfrm>
-            <a:off x="504000" y="1800000"/>
-            <a:ext cx="9071640" cy="2090880"/>
+            <a:off x="504000" y="1768680"/>
+            <a:ext cx="9072000" cy="2090880"/>
           </a:xfrm>
           <a:prstGeom prst="rect">
             <a:avLst/>
@@ -130,8 +133,8 @@
         </p:nvSpPr>
         <p:spPr>
           <a:xfrm>
-            <a:off x="504000" y="4089960"/>
-            <a:ext cx="9071640" cy="2090880"/>
+            <a:off x="504000" y="4058640"/>
+            <a:ext cx="9072000" cy="2090880"/>
           </a:xfrm>
           <a:prstGeom prst="rect">
             <a:avLst/>
@@ -182,8 +185,8 @@
         </p:nvSpPr>
         <p:spPr>
           <a:xfrm>
-            <a:off x="504000" y="304920"/>
-            <a:ext cx="7199640" cy="1262160"/>
+            <a:off x="504000" y="301320"/>
+            <a:ext cx="9072000" cy="1261800"/>
           </a:xfrm>
           <a:prstGeom prst="rect">
             <a:avLst/>
@@ -213,7 +216,7 @@
         </p:nvSpPr>
         <p:spPr>
           <a:xfrm>
-            <a:off x="504000" y="1800000"/>
+            <a:off x="504000" y="1768680"/>
             <a:ext cx="4426920" cy="2090880"/>
           </a:xfrm>
           <a:prstGeom prst="rect">
@@ -243,7 +246,7 @@
         </p:nvSpPr>
         <p:spPr>
           <a:xfrm>
-            <a:off x="5152680" y="1800000"/>
+            <a:off x="5152680" y="1768680"/>
             <a:ext cx="4426920" cy="2090880"/>
           </a:xfrm>
           <a:prstGeom prst="rect">
@@ -273,7 +276,7 @@
         </p:nvSpPr>
         <p:spPr>
           <a:xfrm>
-            <a:off x="504000" y="4089960"/>
+            <a:off x="504000" y="4058640"/>
             <a:ext cx="4426920" cy="2090880"/>
           </a:xfrm>
           <a:prstGeom prst="rect">
@@ -303,7 +306,7 @@
         </p:nvSpPr>
         <p:spPr>
           <a:xfrm>
-            <a:off x="5152680" y="4089960"/>
+            <a:off x="5152680" y="4058640"/>
             <a:ext cx="4426920" cy="2090880"/>
           </a:xfrm>
           <a:prstGeom prst="rect">
@@ -355,8 +358,8 @@
         </p:nvSpPr>
         <p:spPr>
           <a:xfrm>
-            <a:off x="504000" y="304920"/>
-            <a:ext cx="7199640" cy="1262160"/>
+            <a:off x="504000" y="301320"/>
+            <a:ext cx="9072000" cy="1261800"/>
           </a:xfrm>
           <a:prstGeom prst="rect">
             <a:avLst/>
@@ -386,8 +389,8 @@
         </p:nvSpPr>
         <p:spPr>
           <a:xfrm>
-            <a:off x="504000" y="1800000"/>
-            <a:ext cx="2920680" cy="2090880"/>
+            <a:off x="504000" y="1768680"/>
+            <a:ext cx="2921040" cy="2090880"/>
           </a:xfrm>
           <a:prstGeom prst="rect">
             <a:avLst/>
@@ -416,8 +419,8 @@
         </p:nvSpPr>
         <p:spPr>
           <a:xfrm>
-            <a:off x="3571200" y="1800000"/>
-            <a:ext cx="2920680" cy="2090880"/>
+            <a:off x="3571560" y="1768680"/>
+            <a:ext cx="2921040" cy="2090880"/>
           </a:xfrm>
           <a:prstGeom prst="rect">
             <a:avLst/>
@@ -446,8 +449,8 @@
         </p:nvSpPr>
         <p:spPr>
           <a:xfrm>
-            <a:off x="6638040" y="1800000"/>
-            <a:ext cx="2920680" cy="2090880"/>
+            <a:off x="6639120" y="1768680"/>
+            <a:ext cx="2921040" cy="2090880"/>
           </a:xfrm>
           <a:prstGeom prst="rect">
             <a:avLst/>
@@ -476,8 +479,8 @@
         </p:nvSpPr>
         <p:spPr>
           <a:xfrm>
-            <a:off x="504000" y="4089960"/>
-            <a:ext cx="2920680" cy="2090880"/>
+            <a:off x="504000" y="4058640"/>
+            <a:ext cx="2921040" cy="2090880"/>
           </a:xfrm>
           <a:prstGeom prst="rect">
             <a:avLst/>
@@ -506,8 +509,8 @@
         </p:nvSpPr>
         <p:spPr>
           <a:xfrm>
-            <a:off x="3571200" y="4089960"/>
-            <a:ext cx="2920680" cy="2090880"/>
+            <a:off x="3571560" y="4058640"/>
+            <a:ext cx="2921040" cy="2090880"/>
           </a:xfrm>
           <a:prstGeom prst="rect">
             <a:avLst/>
@@ -536,8 +539,8 @@
         </p:nvSpPr>
         <p:spPr>
           <a:xfrm>
-            <a:off x="6638040" y="4089960"/>
-            <a:ext cx="2920680" cy="2090880"/>
+            <a:off x="6639120" y="4058640"/>
+            <a:ext cx="2921040" cy="2090880"/>
           </a:xfrm>
           <a:prstGeom prst="rect">
             <a:avLst/>
@@ -610,8 +613,8 @@
         </p:nvSpPr>
         <p:spPr>
           <a:xfrm>
-            <a:off x="504000" y="304920"/>
-            <a:ext cx="7199640" cy="1262160"/>
+            <a:off x="504000" y="301320"/>
+            <a:ext cx="9072000" cy="1261800"/>
           </a:xfrm>
           <a:prstGeom prst="rect">
             <a:avLst/>
@@ -641,8 +644,8 @@
         </p:nvSpPr>
         <p:spPr>
           <a:xfrm>
-            <a:off x="504000" y="1800000"/>
-            <a:ext cx="9071640" cy="4384080"/>
+            <a:off x="504000" y="1768680"/>
+            <a:ext cx="9072000" cy="4384080"/>
           </a:xfrm>
           <a:prstGeom prst="rect">
             <a:avLst/>
@@ -694,8 +697,8 @@
         </p:nvSpPr>
         <p:spPr>
           <a:xfrm>
-            <a:off x="504000" y="304920"/>
-            <a:ext cx="7199640" cy="1262160"/>
+            <a:off x="504000" y="301320"/>
+            <a:ext cx="9072000" cy="1261800"/>
           </a:xfrm>
           <a:prstGeom prst="rect">
             <a:avLst/>
@@ -725,8 +728,8 @@
         </p:nvSpPr>
         <p:spPr>
           <a:xfrm>
-            <a:off x="504000" y="1800000"/>
-            <a:ext cx="9071640" cy="4384080"/>
+            <a:off x="504000" y="1768680"/>
+            <a:ext cx="9072000" cy="4384080"/>
           </a:xfrm>
           <a:prstGeom prst="rect">
             <a:avLst/>
@@ -777,8 +780,8 @@
         </p:nvSpPr>
         <p:spPr>
           <a:xfrm>
-            <a:off x="504000" y="304920"/>
-            <a:ext cx="7199640" cy="1262160"/>
+            <a:off x="504000" y="301320"/>
+            <a:ext cx="9072000" cy="1261800"/>
           </a:xfrm>
           <a:prstGeom prst="rect">
             <a:avLst/>
@@ -808,7 +811,7 @@
         </p:nvSpPr>
         <p:spPr>
           <a:xfrm>
-            <a:off x="504000" y="1800000"/>
+            <a:off x="504000" y="1768680"/>
             <a:ext cx="4426920" cy="4384080"/>
           </a:xfrm>
           <a:prstGeom prst="rect">
@@ -838,7 +841,7 @@
         </p:nvSpPr>
         <p:spPr>
           <a:xfrm>
-            <a:off x="5152680" y="1800000"/>
+            <a:off x="5152680" y="1768680"/>
             <a:ext cx="4426920" cy="4384080"/>
           </a:xfrm>
           <a:prstGeom prst="rect">
@@ -890,8 +893,8 @@
         </p:nvSpPr>
         <p:spPr>
           <a:xfrm>
-            <a:off x="504000" y="304920"/>
-            <a:ext cx="7199640" cy="1262160"/>
+            <a:off x="504000" y="301320"/>
+            <a:ext cx="9072000" cy="1261800"/>
           </a:xfrm>
           <a:prstGeom prst="rect">
             <a:avLst/>
@@ -943,8 +946,8 @@
         </p:nvSpPr>
         <p:spPr>
           <a:xfrm>
-            <a:off x="504000" y="304920"/>
-            <a:ext cx="7199640" cy="5851800"/>
+            <a:off x="504000" y="301320"/>
+            <a:ext cx="9072000" cy="5850360"/>
           </a:xfrm>
           <a:prstGeom prst="rect">
             <a:avLst/>
@@ -996,8 +999,8 @@
         </p:nvSpPr>
         <p:spPr>
           <a:xfrm>
-            <a:off x="504000" y="304920"/>
-            <a:ext cx="7199640" cy="1262160"/>
+            <a:off x="504000" y="301320"/>
+            <a:ext cx="9072000" cy="1261800"/>
           </a:xfrm>
           <a:prstGeom prst="rect">
             <a:avLst/>
@@ -1027,7 +1030,7 @@
         </p:nvSpPr>
         <p:spPr>
           <a:xfrm>
-            <a:off x="504000" y="1800000"/>
+            <a:off x="504000" y="1768680"/>
             <a:ext cx="4426920" cy="2090880"/>
           </a:xfrm>
           <a:prstGeom prst="rect">
@@ -1057,7 +1060,7 @@
         </p:nvSpPr>
         <p:spPr>
           <a:xfrm>
-            <a:off x="5152680" y="1800000"/>
+            <a:off x="5152680" y="1768680"/>
             <a:ext cx="4426920" cy="4384080"/>
           </a:xfrm>
           <a:prstGeom prst="rect">
@@ -1087,7 +1090,7 @@
         </p:nvSpPr>
         <p:spPr>
           <a:xfrm>
-            <a:off x="504000" y="4089960"/>
+            <a:off x="504000" y="4058640"/>
             <a:ext cx="4426920" cy="2090880"/>
           </a:xfrm>
           <a:prstGeom prst="rect">
@@ -1139,8 +1142,8 @@
         </p:nvSpPr>
         <p:spPr>
           <a:xfrm>
-            <a:off x="504000" y="304920"/>
-            <a:ext cx="7199640" cy="1262160"/>
+            <a:off x="504000" y="301320"/>
+            <a:ext cx="9072000" cy="1261800"/>
           </a:xfrm>
           <a:prstGeom prst="rect">
             <a:avLst/>
@@ -1170,8 +1173,8 @@
         </p:nvSpPr>
         <p:spPr>
           <a:xfrm>
-            <a:off x="504000" y="1800000"/>
-            <a:ext cx="9071640" cy="4384080"/>
+            <a:off x="504000" y="1768680"/>
+            <a:ext cx="9072000" cy="4384080"/>
           </a:xfrm>
           <a:prstGeom prst="rect">
             <a:avLst/>
@@ -1223,8 +1226,8 @@
         </p:nvSpPr>
         <p:spPr>
           <a:xfrm>
-            <a:off x="504000" y="304920"/>
-            <a:ext cx="7199640" cy="1262160"/>
+            <a:off x="504000" y="301320"/>
+            <a:ext cx="9072000" cy="1261800"/>
           </a:xfrm>
           <a:prstGeom prst="rect">
             <a:avLst/>
@@ -1254,7 +1257,7 @@
         </p:nvSpPr>
         <p:spPr>
           <a:xfrm>
-            <a:off x="504000" y="1800000"/>
+            <a:off x="504000" y="1768680"/>
             <a:ext cx="4426920" cy="4384080"/>
           </a:xfrm>
           <a:prstGeom prst="rect">
@@ -1284,7 +1287,7 @@
         </p:nvSpPr>
         <p:spPr>
           <a:xfrm>
-            <a:off x="5152680" y="1800000"/>
+            <a:off x="5152680" y="1768680"/>
             <a:ext cx="4426920" cy="2090880"/>
           </a:xfrm>
           <a:prstGeom prst="rect">
@@ -1314,7 +1317,7 @@
         </p:nvSpPr>
         <p:spPr>
           <a:xfrm>
-            <a:off x="5152680" y="4089960"/>
+            <a:off x="5152680" y="4058640"/>
             <a:ext cx="4426920" cy="2090880"/>
           </a:xfrm>
           <a:prstGeom prst="rect">
@@ -1366,8 +1369,8 @@
         </p:nvSpPr>
         <p:spPr>
           <a:xfrm>
-            <a:off x="504000" y="304920"/>
-            <a:ext cx="7199640" cy="1262160"/>
+            <a:off x="504000" y="301320"/>
+            <a:ext cx="9072000" cy="1261800"/>
           </a:xfrm>
           <a:prstGeom prst="rect">
             <a:avLst/>
@@ -1397,7 +1400,7 @@
         </p:nvSpPr>
         <p:spPr>
           <a:xfrm>
-            <a:off x="504000" y="1800000"/>
+            <a:off x="504000" y="1768680"/>
             <a:ext cx="4426920" cy="2090880"/>
           </a:xfrm>
           <a:prstGeom prst="rect">
@@ -1427,7 +1430,7 @@
         </p:nvSpPr>
         <p:spPr>
           <a:xfrm>
-            <a:off x="5152680" y="1800000"/>
+            <a:off x="5152680" y="1768680"/>
             <a:ext cx="4426920" cy="2090880"/>
           </a:xfrm>
           <a:prstGeom prst="rect">
@@ -1457,8 +1460,8 @@
         </p:nvSpPr>
         <p:spPr>
           <a:xfrm>
-            <a:off x="504000" y="4089960"/>
-            <a:ext cx="9071640" cy="2090880"/>
+            <a:off x="504000" y="4058640"/>
+            <a:ext cx="9072000" cy="2090880"/>
           </a:xfrm>
           <a:prstGeom prst="rect">
             <a:avLst/>
@@ -1509,8 +1512,8 @@
         </p:nvSpPr>
         <p:spPr>
           <a:xfrm>
-            <a:off x="504000" y="304920"/>
-            <a:ext cx="7199640" cy="1262160"/>
+            <a:off x="504000" y="301320"/>
+            <a:ext cx="9072000" cy="1261800"/>
           </a:xfrm>
           <a:prstGeom prst="rect">
             <a:avLst/>
@@ -1540,8 +1543,8 @@
         </p:nvSpPr>
         <p:spPr>
           <a:xfrm>
-            <a:off x="504000" y="1800000"/>
-            <a:ext cx="9071640" cy="2090880"/>
+            <a:off x="504000" y="1768680"/>
+            <a:ext cx="9072000" cy="2090880"/>
           </a:xfrm>
           <a:prstGeom prst="rect">
             <a:avLst/>
@@ -1570,8 +1573,8 @@
         </p:nvSpPr>
         <p:spPr>
           <a:xfrm>
-            <a:off x="504000" y="4089960"/>
-            <a:ext cx="9071640" cy="2090880"/>
+            <a:off x="504000" y="4058640"/>
+            <a:ext cx="9072000" cy="2090880"/>
           </a:xfrm>
           <a:prstGeom prst="rect">
             <a:avLst/>
@@ -1622,8 +1625,8 @@
         </p:nvSpPr>
         <p:spPr>
           <a:xfrm>
-            <a:off x="504000" y="304920"/>
-            <a:ext cx="7199640" cy="1262160"/>
+            <a:off x="504000" y="301320"/>
+            <a:ext cx="9072000" cy="1261800"/>
           </a:xfrm>
           <a:prstGeom prst="rect">
             <a:avLst/>
@@ -1653,7 +1656,7 @@
         </p:nvSpPr>
         <p:spPr>
           <a:xfrm>
-            <a:off x="504000" y="1800000"/>
+            <a:off x="504000" y="1768680"/>
             <a:ext cx="4426920" cy="2090880"/>
           </a:xfrm>
           <a:prstGeom prst="rect">
@@ -1683,7 +1686,7 @@
         </p:nvSpPr>
         <p:spPr>
           <a:xfrm>
-            <a:off x="5152680" y="1800000"/>
+            <a:off x="5152680" y="1768680"/>
             <a:ext cx="4426920" cy="2090880"/>
           </a:xfrm>
           <a:prstGeom prst="rect">
@@ -1713,7 +1716,7 @@
         </p:nvSpPr>
         <p:spPr>
           <a:xfrm>
-            <a:off x="504000" y="4089960"/>
+            <a:off x="504000" y="4058640"/>
             <a:ext cx="4426920" cy="2090880"/>
           </a:xfrm>
           <a:prstGeom prst="rect">
@@ -1743,7 +1746,7 @@
         </p:nvSpPr>
         <p:spPr>
           <a:xfrm>
-            <a:off x="5152680" y="4089960"/>
+            <a:off x="5152680" y="4058640"/>
             <a:ext cx="4426920" cy="2090880"/>
           </a:xfrm>
           <a:prstGeom prst="rect">
@@ -1795,8 +1798,8 @@
         </p:nvSpPr>
         <p:spPr>
           <a:xfrm>
-            <a:off x="504000" y="304920"/>
-            <a:ext cx="7199640" cy="1262160"/>
+            <a:off x="504000" y="301320"/>
+            <a:ext cx="9072000" cy="1261800"/>
           </a:xfrm>
           <a:prstGeom prst="rect">
             <a:avLst/>
@@ -1826,8 +1829,8 @@
         </p:nvSpPr>
         <p:spPr>
           <a:xfrm>
-            <a:off x="504000" y="1800000"/>
-            <a:ext cx="2920680" cy="2090880"/>
+            <a:off x="504000" y="1768680"/>
+            <a:ext cx="2921040" cy="2090880"/>
           </a:xfrm>
           <a:prstGeom prst="rect">
             <a:avLst/>
@@ -1856,8 +1859,8 @@
         </p:nvSpPr>
         <p:spPr>
           <a:xfrm>
-            <a:off x="3571200" y="1800000"/>
-            <a:ext cx="2920680" cy="2090880"/>
+            <a:off x="3571560" y="1768680"/>
+            <a:ext cx="2921040" cy="2090880"/>
           </a:xfrm>
           <a:prstGeom prst="rect">
             <a:avLst/>
@@ -1886,8 +1889,8 @@
         </p:nvSpPr>
         <p:spPr>
           <a:xfrm>
-            <a:off x="6638040" y="1800000"/>
-            <a:ext cx="2920680" cy="2090880"/>
+            <a:off x="6639120" y="1768680"/>
+            <a:ext cx="2921040" cy="2090880"/>
           </a:xfrm>
           <a:prstGeom prst="rect">
             <a:avLst/>
@@ -1916,8 +1919,8 @@
         </p:nvSpPr>
         <p:spPr>
           <a:xfrm>
-            <a:off x="504000" y="4089960"/>
-            <a:ext cx="2920680" cy="2090880"/>
+            <a:off x="504000" y="4058640"/>
+            <a:ext cx="2921040" cy="2090880"/>
           </a:xfrm>
           <a:prstGeom prst="rect">
             <a:avLst/>
@@ -1946,8 +1949,8 @@
         </p:nvSpPr>
         <p:spPr>
           <a:xfrm>
-            <a:off x="3571200" y="4089960"/>
-            <a:ext cx="2920680" cy="2090880"/>
+            <a:off x="3571560" y="4058640"/>
+            <a:ext cx="2921040" cy="2090880"/>
           </a:xfrm>
           <a:prstGeom prst="rect">
             <a:avLst/>
@@ -1976,8 +1979,8 @@
         </p:nvSpPr>
         <p:spPr>
           <a:xfrm>
-            <a:off x="6638040" y="4089960"/>
-            <a:ext cx="2920680" cy="2090880"/>
+            <a:off x="6639120" y="4058640"/>
+            <a:ext cx="2921040" cy="2090880"/>
           </a:xfrm>
           <a:prstGeom prst="rect">
             <a:avLst/>
@@ -2028,8 +2031,8 @@
         </p:nvSpPr>
         <p:spPr>
           <a:xfrm>
-            <a:off x="504000" y="304920"/>
-            <a:ext cx="7199640" cy="1262160"/>
+            <a:off x="504000" y="301320"/>
+            <a:ext cx="9072000" cy="1261800"/>
           </a:xfrm>
           <a:prstGeom prst="rect">
             <a:avLst/>
@@ -2059,8 +2062,8 @@
         </p:nvSpPr>
         <p:spPr>
           <a:xfrm>
-            <a:off x="504000" y="1800000"/>
-            <a:ext cx="9071640" cy="4384080"/>
+            <a:off x="504000" y="1768680"/>
+            <a:ext cx="9072000" cy="4384080"/>
           </a:xfrm>
           <a:prstGeom prst="rect">
             <a:avLst/>
@@ -2111,8 +2114,8 @@
         </p:nvSpPr>
         <p:spPr>
           <a:xfrm>
-            <a:off x="504000" y="304920"/>
-            <a:ext cx="7199640" cy="1262160"/>
+            <a:off x="504000" y="301320"/>
+            <a:ext cx="9072000" cy="1261800"/>
           </a:xfrm>
           <a:prstGeom prst="rect">
             <a:avLst/>
@@ -2142,7 +2145,7 @@
         </p:nvSpPr>
         <p:spPr>
           <a:xfrm>
-            <a:off x="504000" y="1800000"/>
+            <a:off x="504000" y="1768680"/>
             <a:ext cx="4426920" cy="4384080"/>
           </a:xfrm>
           <a:prstGeom prst="rect">
@@ -2172,7 +2175,7 @@
         </p:nvSpPr>
         <p:spPr>
           <a:xfrm>
-            <a:off x="5152680" y="1800000"/>
+            <a:off x="5152680" y="1768680"/>
             <a:ext cx="4426920" cy="4384080"/>
           </a:xfrm>
           <a:prstGeom prst="rect">
@@ -2224,8 +2227,8 @@
         </p:nvSpPr>
         <p:spPr>
           <a:xfrm>
-            <a:off x="504000" y="304920"/>
-            <a:ext cx="7199640" cy="1262160"/>
+            <a:off x="504000" y="301320"/>
+            <a:ext cx="9072000" cy="1261800"/>
           </a:xfrm>
           <a:prstGeom prst="rect">
             <a:avLst/>
@@ -2277,8 +2280,8 @@
         </p:nvSpPr>
         <p:spPr>
           <a:xfrm>
-            <a:off x="504000" y="304920"/>
-            <a:ext cx="7199640" cy="5851800"/>
+            <a:off x="504000" y="301320"/>
+            <a:ext cx="9072000" cy="5850360"/>
           </a:xfrm>
           <a:prstGeom prst="rect">
             <a:avLst/>
@@ -2330,8 +2333,8 @@
         </p:nvSpPr>
         <p:spPr>
           <a:xfrm>
-            <a:off x="504000" y="304920"/>
-            <a:ext cx="7199640" cy="1262160"/>
+            <a:off x="504000" y="301320"/>
+            <a:ext cx="9072000" cy="1261800"/>
           </a:xfrm>
           <a:prstGeom prst="rect">
             <a:avLst/>
@@ -2361,7 +2364,7 @@
         </p:nvSpPr>
         <p:spPr>
           <a:xfrm>
-            <a:off x="504000" y="1800000"/>
+            <a:off x="504000" y="1768680"/>
             <a:ext cx="4426920" cy="2090880"/>
           </a:xfrm>
           <a:prstGeom prst="rect">
@@ -2391,7 +2394,7 @@
         </p:nvSpPr>
         <p:spPr>
           <a:xfrm>
-            <a:off x="5152680" y="1800000"/>
+            <a:off x="5152680" y="1768680"/>
             <a:ext cx="4426920" cy="4384080"/>
           </a:xfrm>
           <a:prstGeom prst="rect">
@@ -2421,7 +2424,7 @@
         </p:nvSpPr>
         <p:spPr>
           <a:xfrm>
-            <a:off x="504000" y="4089960"/>
+            <a:off x="504000" y="4058640"/>
             <a:ext cx="4426920" cy="2090880"/>
           </a:xfrm>
           <a:prstGeom prst="rect">
@@ -2473,8 +2476,8 @@
         </p:nvSpPr>
         <p:spPr>
           <a:xfrm>
-            <a:off x="504000" y="304920"/>
-            <a:ext cx="7199640" cy="1262160"/>
+            <a:off x="504000" y="301320"/>
+            <a:ext cx="9072000" cy="1261800"/>
           </a:xfrm>
           <a:prstGeom prst="rect">
             <a:avLst/>
@@ -2504,7 +2507,7 @@
         </p:nvSpPr>
         <p:spPr>
           <a:xfrm>
-            <a:off x="504000" y="1800000"/>
+            <a:off x="504000" y="1768680"/>
             <a:ext cx="4426920" cy="4384080"/>
           </a:xfrm>
           <a:prstGeom prst="rect">
@@ -2534,7 +2537,7 @@
         </p:nvSpPr>
         <p:spPr>
           <a:xfrm>
-            <a:off x="5152680" y="1800000"/>
+            <a:off x="5152680" y="1768680"/>
             <a:ext cx="4426920" cy="2090880"/>
           </a:xfrm>
           <a:prstGeom prst="rect">
@@ -2564,7 +2567,7 @@
         </p:nvSpPr>
         <p:spPr>
           <a:xfrm>
-            <a:off x="5152680" y="4089960"/>
+            <a:off x="5152680" y="4058640"/>
             <a:ext cx="4426920" cy="2090880"/>
           </a:xfrm>
           <a:prstGeom prst="rect">
@@ -2616,8 +2619,8 @@
         </p:nvSpPr>
         <p:spPr>
           <a:xfrm>
-            <a:off x="504000" y="304920"/>
-            <a:ext cx="7199640" cy="1262160"/>
+            <a:off x="504000" y="301320"/>
+            <a:ext cx="9072000" cy="1261800"/>
           </a:xfrm>
           <a:prstGeom prst="rect">
             <a:avLst/>
@@ -2647,7 +2650,7 @@
         </p:nvSpPr>
         <p:spPr>
           <a:xfrm>
-            <a:off x="504000" y="1800000"/>
+            <a:off x="504000" y="1768680"/>
             <a:ext cx="4426920" cy="2090880"/>
           </a:xfrm>
           <a:prstGeom prst="rect">
@@ -2677,7 +2680,7 @@
         </p:nvSpPr>
         <p:spPr>
           <a:xfrm>
-            <a:off x="5152680" y="1800000"/>
+            <a:off x="5152680" y="1768680"/>
             <a:ext cx="4426920" cy="2090880"/>
           </a:xfrm>
           <a:prstGeom prst="rect">
@@ -2707,8 +2710,8 @@
         </p:nvSpPr>
         <p:spPr>
           <a:xfrm>
-            <a:off x="504000" y="4089960"/>
-            <a:ext cx="9071640" cy="2090880"/>
+            <a:off x="504000" y="4058640"/>
+            <a:ext cx="9072000" cy="2090880"/>
           </a:xfrm>
           <a:prstGeom prst="rect">
             <a:avLst/>
@@ -2760,7 +2763,7 @@
         <p:spPr>
           <a:xfrm>
             <a:off x="720" y="720"/>
-            <a:ext cx="10079280" cy="7559280"/>
+            <a:ext cx="10078920" cy="7558920"/>
           </a:xfrm>
           <a:prstGeom prst="rect">
             <a:avLst/>
@@ -2783,7 +2786,7 @@
         <p:spPr>
           <a:xfrm>
             <a:off x="504000" y="304920"/>
-            <a:ext cx="7199640" cy="1262160"/>
+            <a:ext cx="7199280" cy="1262160"/>
           </a:xfrm>
           <a:prstGeom prst="rect">
             <a:avLst/>
@@ -2818,8 +2821,8 @@
         </p:nvSpPr>
         <p:spPr>
           <a:xfrm>
-            <a:off x="504000" y="1768680"/>
-            <a:ext cx="9072000" cy="4384080"/>
+            <a:off x="504000" y="1800000"/>
+            <a:ext cx="9071280" cy="4383720"/>
           </a:xfrm>
           <a:prstGeom prst="rect">
             <a:avLst/>
@@ -2842,12 +2845,12 @@
               <a:buChar char=""/>
             </a:pPr>
             <a:r>
-              <a:rPr b="0" lang="en-US" sz="3200" spc="-1" strike="noStrike">
+              <a:rPr b="0" lang="en-US" sz="1800" spc="-1" strike="noStrike">
                 <a:latin typeface="Arial"/>
               </a:rPr>
               <a:t>Click to edit the outline text format</a:t>
             </a:r>
-            <a:endParaRPr b="0" lang="en-US" sz="3200" spc="-1" strike="noStrike">
+            <a:endParaRPr b="0" lang="en-US" sz="1800" spc="-1" strike="noStrike">
               <a:latin typeface="Arial"/>
             </a:endParaRPr>
           </a:p>
@@ -2864,12 +2867,12 @@
               <a:buChar char=""/>
             </a:pPr>
             <a:r>
-              <a:rPr b="0" lang="en-US" sz="2800" spc="-1" strike="noStrike">
+              <a:rPr b="0" lang="en-US" sz="1800" spc="-1" strike="noStrike">
                 <a:latin typeface="Arial"/>
               </a:rPr>
               <a:t>Second Outline Level</a:t>
             </a:r>
-            <a:endParaRPr b="0" lang="en-US" sz="2800" spc="-1" strike="noStrike">
+            <a:endParaRPr b="0" lang="en-US" sz="1800" spc="-1" strike="noStrike">
               <a:latin typeface="Arial"/>
             </a:endParaRPr>
           </a:p>
@@ -2886,12 +2889,12 @@
               <a:buChar char=""/>
             </a:pPr>
             <a:r>
-              <a:rPr b="0" lang="en-US" sz="2400" spc="-1" strike="noStrike">
+              <a:rPr b="0" lang="en-US" sz="1800" spc="-1" strike="noStrike">
                 <a:latin typeface="Arial"/>
               </a:rPr>
               <a:t>Third Outline Level</a:t>
             </a:r>
-            <a:endParaRPr b="0" lang="en-US" sz="2400" spc="-1" strike="noStrike">
+            <a:endParaRPr b="0" lang="en-US" sz="1800" spc="-1" strike="noStrike">
               <a:latin typeface="Arial"/>
             </a:endParaRPr>
           </a:p>
@@ -2908,12 +2911,12 @@
               <a:buChar char=""/>
             </a:pPr>
             <a:r>
-              <a:rPr b="0" lang="en-US" sz="2000" spc="-1" strike="noStrike">
+              <a:rPr b="0" lang="en-US" sz="1800" spc="-1" strike="noStrike">
                 <a:latin typeface="Arial"/>
               </a:rPr>
               <a:t>Fourth Outline Level</a:t>
             </a:r>
-            <a:endParaRPr b="0" lang="en-US" sz="2000" spc="-1" strike="noStrike">
+            <a:endParaRPr b="0" lang="en-US" sz="1800" spc="-1" strike="noStrike">
               <a:latin typeface="Arial"/>
             </a:endParaRPr>
           </a:p>
@@ -2930,12 +2933,12 @@
               <a:buChar char=""/>
             </a:pPr>
             <a:r>
-              <a:rPr b="0" lang="en-US" sz="2000" spc="-1" strike="noStrike">
+              <a:rPr b="0" lang="en-US" sz="1800" spc="-1" strike="noStrike">
                 <a:latin typeface="Arial"/>
               </a:rPr>
               <a:t>Fifth Outline Level</a:t>
             </a:r>
-            <a:endParaRPr b="0" lang="en-US" sz="2000" spc="-1" strike="noStrike">
+            <a:endParaRPr b="0" lang="en-US" sz="1800" spc="-1" strike="noStrike">
               <a:latin typeface="Arial"/>
             </a:endParaRPr>
           </a:p>
@@ -2952,12 +2955,12 @@
               <a:buChar char=""/>
             </a:pPr>
             <a:r>
-              <a:rPr b="0" lang="en-US" sz="2000" spc="-1" strike="noStrike">
+              <a:rPr b="0" lang="en-US" sz="1800" spc="-1" strike="noStrike">
                 <a:latin typeface="Arial"/>
               </a:rPr>
               <a:t>Sixth Outline Level</a:t>
             </a:r>
-            <a:endParaRPr b="0" lang="en-US" sz="2000" spc="-1" strike="noStrike">
+            <a:endParaRPr b="0" lang="en-US" sz="1800" spc="-1" strike="noStrike">
               <a:latin typeface="Arial"/>
             </a:endParaRPr>
           </a:p>
@@ -2974,12 +2977,12 @@
               <a:buChar char=""/>
             </a:pPr>
             <a:r>
-              <a:rPr b="0" lang="en-US" sz="2000" spc="-1" strike="noStrike">
+              <a:rPr b="0" lang="en-US" sz="1800" spc="-1" strike="noStrike">
                 <a:latin typeface="Arial"/>
               </a:rPr>
               <a:t>Seventh Outline Level</a:t>
             </a:r>
-            <a:endParaRPr b="0" lang="en-US" sz="2000" spc="-1" strike="noStrike">
+            <a:endParaRPr b="0" lang="en-US" sz="1800" spc="-1" strike="noStrike">
               <a:latin typeface="Arial"/>
             </a:endParaRPr>
           </a:p>
@@ -3035,7 +3038,7 @@
         <p:spPr>
           <a:xfrm>
             <a:off x="720" y="720"/>
-            <a:ext cx="10079280" cy="7559280"/>
+            <a:ext cx="10078920" cy="7558920"/>
           </a:xfrm>
           <a:prstGeom prst="rect">
             <a:avLst/>
@@ -3057,8 +3060,8 @@
         </p:nvSpPr>
         <p:spPr>
           <a:xfrm>
-            <a:off x="504000" y="304920"/>
-            <a:ext cx="7199640" cy="1262160"/>
+            <a:off x="504000" y="301320"/>
+            <a:ext cx="9072000" cy="1261800"/>
           </a:xfrm>
           <a:prstGeom prst="rect">
             <a:avLst/>
@@ -3066,16 +3069,17 @@
         </p:spPr>
         <p:txBody>
           <a:bodyPr lIns="0" rIns="0" tIns="0" bIns="0" anchor="ctr">
-            <a:spAutoFit/>
-          </a:bodyPr>
-          <a:p>
-            <a:r>
-              <a:rPr b="0" lang="en-US" sz="1800" spc="-1" strike="noStrike">
+            <a:noAutofit/>
+          </a:bodyPr>
+          <a:p>
+            <a:pPr algn="ctr"/>
+            <a:r>
+              <a:rPr b="0" lang="en-US" sz="4400" spc="-1" strike="noStrike">
                 <a:latin typeface="Arial"/>
               </a:rPr>
               <a:t>Click to edit the title text format</a:t>
             </a:r>
-            <a:endParaRPr b="0" lang="en-US" sz="1800" spc="-1" strike="noStrike">
+            <a:endParaRPr b="0" lang="en-US" sz="4400" spc="-1" strike="noStrike">
               <a:latin typeface="Arial"/>
             </a:endParaRPr>
           </a:p>
@@ -3093,8 +3097,8 @@
         </p:nvSpPr>
         <p:spPr>
           <a:xfrm>
-            <a:off x="504000" y="1800000"/>
-            <a:ext cx="9071640" cy="4384080"/>
+            <a:off x="504000" y="1768680"/>
+            <a:ext cx="9072000" cy="4384080"/>
           </a:xfrm>
           <a:prstGeom prst="rect">
             <a:avLst/>
@@ -3117,12 +3121,12 @@
               <a:buChar char=""/>
             </a:pPr>
             <a:r>
-              <a:rPr b="0" lang="en-US" sz="1800" spc="-1" strike="noStrike">
+              <a:rPr b="0" lang="en-US" sz="3200" spc="-1" strike="noStrike">
                 <a:latin typeface="Arial"/>
               </a:rPr>
               <a:t>Click to edit the outline text format</a:t>
             </a:r>
-            <a:endParaRPr b="0" lang="en-US" sz="1800" spc="-1" strike="noStrike">
+            <a:endParaRPr b="0" lang="en-US" sz="3200" spc="-1" strike="noStrike">
               <a:latin typeface="Arial"/>
             </a:endParaRPr>
           </a:p>
@@ -3139,12 +3143,12 @@
               <a:buChar char=""/>
             </a:pPr>
             <a:r>
-              <a:rPr b="0" lang="en-US" sz="1800" spc="-1" strike="noStrike">
+              <a:rPr b="0" lang="en-US" sz="2800" spc="-1" strike="noStrike">
                 <a:latin typeface="Arial"/>
               </a:rPr>
               <a:t>Second Outline Level</a:t>
             </a:r>
-            <a:endParaRPr b="0" lang="en-US" sz="1800" spc="-1" strike="noStrike">
+            <a:endParaRPr b="0" lang="en-US" sz="2800" spc="-1" strike="noStrike">
               <a:latin typeface="Arial"/>
             </a:endParaRPr>
           </a:p>
@@ -3161,12 +3165,12 @@
               <a:buChar char=""/>
             </a:pPr>
             <a:r>
-              <a:rPr b="0" lang="en-US" sz="1800" spc="-1" strike="noStrike">
+              <a:rPr b="0" lang="en-US" sz="2400" spc="-1" strike="noStrike">
                 <a:latin typeface="Arial"/>
               </a:rPr>
               <a:t>Third Outline Level</a:t>
             </a:r>
-            <a:endParaRPr b="0" lang="en-US" sz="1800" spc="-1" strike="noStrike">
+            <a:endParaRPr b="0" lang="en-US" sz="2400" spc="-1" strike="noStrike">
               <a:latin typeface="Arial"/>
             </a:endParaRPr>
           </a:p>
@@ -3183,12 +3187,12 @@
               <a:buChar char=""/>
             </a:pPr>
             <a:r>
-              <a:rPr b="0" lang="en-US" sz="1800" spc="-1" strike="noStrike">
+              <a:rPr b="0" lang="en-US" sz="2000" spc="-1" strike="noStrike">
                 <a:latin typeface="Arial"/>
               </a:rPr>
               <a:t>Fourth Outline Level</a:t>
             </a:r>
-            <a:endParaRPr b="0" lang="en-US" sz="1800" spc="-1" strike="noStrike">
+            <a:endParaRPr b="0" lang="en-US" sz="2000" spc="-1" strike="noStrike">
               <a:latin typeface="Arial"/>
             </a:endParaRPr>
           </a:p>
@@ -3205,12 +3209,12 @@
               <a:buChar char=""/>
             </a:pPr>
             <a:r>
-              <a:rPr b="0" lang="en-US" sz="1800" spc="-1" strike="noStrike">
+              <a:rPr b="0" lang="en-US" sz="2000" spc="-1" strike="noStrike">
                 <a:latin typeface="Arial"/>
               </a:rPr>
               <a:t>Fifth Outline Level</a:t>
             </a:r>
-            <a:endParaRPr b="0" lang="en-US" sz="1800" spc="-1" strike="noStrike">
+            <a:endParaRPr b="0" lang="en-US" sz="2000" spc="-1" strike="noStrike">
               <a:latin typeface="Arial"/>
             </a:endParaRPr>
           </a:p>
@@ -3227,12 +3231,12 @@
               <a:buChar char=""/>
             </a:pPr>
             <a:r>
-              <a:rPr b="0" lang="en-US" sz="1800" spc="-1" strike="noStrike">
+              <a:rPr b="0" lang="en-US" sz="2000" spc="-1" strike="noStrike">
                 <a:latin typeface="Arial"/>
               </a:rPr>
               <a:t>Sixth Outline Level</a:t>
             </a:r>
-            <a:endParaRPr b="0" lang="en-US" sz="1800" spc="-1" strike="noStrike">
+            <a:endParaRPr b="0" lang="en-US" sz="2000" spc="-1" strike="noStrike">
               <a:latin typeface="Arial"/>
             </a:endParaRPr>
           </a:p>
@@ -3249,12 +3253,12 @@
               <a:buChar char=""/>
             </a:pPr>
             <a:r>
-              <a:rPr b="0" lang="en-US" sz="1800" spc="-1" strike="noStrike">
+              <a:rPr b="0" lang="en-US" sz="2000" spc="-1" strike="noStrike">
                 <a:latin typeface="Arial"/>
               </a:rPr>
               <a:t>Seventh Outline Level</a:t>
             </a:r>
-            <a:endParaRPr b="0" lang="en-US" sz="1800" spc="-1" strike="noStrike">
+            <a:endParaRPr b="0" lang="en-US" sz="2000" spc="-1" strike="noStrike">
               <a:latin typeface="Arial"/>
             </a:endParaRPr>
           </a:p>
@@ -3306,7 +3310,7 @@
         <p:spPr>
           <a:xfrm>
             <a:off x="504000" y="576000"/>
-            <a:ext cx="7199640" cy="719640"/>
+            <a:ext cx="7199280" cy="719280"/>
           </a:xfrm>
           <a:prstGeom prst="rect">
             <a:avLst/>
@@ -3332,7 +3336,7 @@
         <p:spPr>
           <a:xfrm>
             <a:off x="504000" y="3747960"/>
-            <a:ext cx="9071640" cy="488160"/>
+            <a:ext cx="9071280" cy="487800"/>
           </a:xfrm>
           <a:prstGeom prst="rect">
             <a:avLst/>
@@ -3360,7 +3364,11 @@
             </a:pPr>
             <a:r>
               <a:rPr b="0" lang="en-US" sz="3200" spc="-1" strike="noStrike">
-                <a:latin typeface="Arial"/>
+                <a:solidFill>
+                  <a:srgbClr val="000000"/>
+                </a:solidFill>
+                <a:latin typeface="Arial"/>
+                <a:ea typeface="DejaVu Sans"/>
               </a:rPr>
               <a:t>C# Application with Entity Framework</a:t>
             </a:r>
@@ -3409,7 +3417,7 @@
         <p:spPr>
           <a:xfrm>
             <a:off x="504000" y="576000"/>
-            <a:ext cx="7199640" cy="719640"/>
+            <a:ext cx="7199280" cy="719280"/>
           </a:xfrm>
           <a:prstGeom prst="rect">
             <a:avLst/>
@@ -3435,7 +3443,7 @@
         <p:spPr>
           <a:xfrm>
             <a:off x="504000" y="1800000"/>
-            <a:ext cx="9071640" cy="4384080"/>
+            <a:ext cx="9071280" cy="4383720"/>
           </a:xfrm>
           <a:prstGeom prst="rect">
             <a:avLst/>
@@ -3456,7 +3464,7 @@
             <a:normAutofit/>
           </a:bodyPr>
           <a:p>
-            <a:pPr marL="432000" indent="-323640">
+            <a:pPr marL="432000" indent="-323280">
               <a:lnSpc>
                 <a:spcPct val="100000"/>
               </a:lnSpc>
@@ -3472,7 +3480,11 @@
             </a:pPr>
             <a:r>
               <a:rPr b="0" lang="en-US" sz="2600" spc="-1" strike="noStrike">
-                <a:latin typeface="Arial"/>
+                <a:solidFill>
+                  <a:srgbClr val="000000"/>
+                </a:solidFill>
+                <a:latin typeface="Arial"/>
+                <a:ea typeface="DejaVu Sans"/>
               </a:rPr>
               <a:t>Goal of the application: Create an application that shows the details of a sale made by a sales person at a particular sales region.</a:t>
             </a:r>
@@ -3481,7 +3493,7 @@
             </a:endParaRPr>
           </a:p>
           <a:p>
-            <a:pPr marL="432000" indent="-323640">
+            <a:pPr marL="432000" indent="-323280">
               <a:lnSpc>
                 <a:spcPct val="100000"/>
               </a:lnSpc>
@@ -3497,7 +3509,11 @@
             </a:pPr>
             <a:r>
               <a:rPr b="0" lang="en-US" sz="2600" spc="-1" strike="noStrike">
-                <a:latin typeface="Arial"/>
+                <a:solidFill>
+                  <a:srgbClr val="000000"/>
+                </a:solidFill>
+                <a:latin typeface="Arial"/>
+                <a:ea typeface="DejaVu Sans"/>
               </a:rPr>
               <a:t>SalesRegion: Name, Code (given for a region),Sales made in that region, SalesPerson, Active/Inactive state.</a:t>
             </a:r>
@@ -3506,7 +3522,7 @@
             </a:endParaRPr>
           </a:p>
           <a:p>
-            <a:pPr marL="432000" indent="-323640">
+            <a:pPr marL="432000" indent="-323280">
               <a:lnSpc>
                 <a:spcPct val="100000"/>
               </a:lnSpc>
@@ -3522,7 +3538,11 @@
             </a:pPr>
             <a:r>
               <a:rPr b="0" lang="en-US" sz="2600" spc="-1" strike="noStrike">
-                <a:latin typeface="Arial"/>
+                <a:solidFill>
+                  <a:srgbClr val="000000"/>
+                </a:solidFill>
+                <a:latin typeface="Arial"/>
+                <a:ea typeface="DejaVu Sans"/>
               </a:rPr>
               <a:t>SalesPerson: Firstname, Lastname, Sales, SalesRegion, Active/Inactive state.</a:t>
             </a:r>
@@ -3531,7 +3551,7 @@
             </a:endParaRPr>
           </a:p>
           <a:p>
-            <a:pPr marL="432000" indent="-323640">
+            <a:pPr marL="432000" indent="-323280">
               <a:lnSpc>
                 <a:spcPct val="100000"/>
               </a:lnSpc>
@@ -3547,7 +3567,11 @@
             </a:pPr>
             <a:r>
               <a:rPr b="0" lang="en-US" sz="2600" spc="-1" strike="noStrike">
-                <a:latin typeface="Arial"/>
+                <a:solidFill>
+                  <a:srgbClr val="000000"/>
+                </a:solidFill>
+                <a:latin typeface="Arial"/>
+                <a:ea typeface="DejaVu Sans"/>
               </a:rPr>
               <a:t>Sales: Amount, Date, SalesRegion, SalesPerson.</a:t>
             </a:r>
@@ -3596,7 +3620,7 @@
         <p:spPr>
           <a:xfrm>
             <a:off x="504000" y="576000"/>
-            <a:ext cx="7199640" cy="719640"/>
+            <a:ext cx="7199280" cy="719280"/>
           </a:xfrm>
           <a:prstGeom prst="rect">
             <a:avLst/>
@@ -3622,7 +3646,7 @@
         <p:spPr>
           <a:xfrm>
             <a:off x="504000" y="1800000"/>
-            <a:ext cx="9071640" cy="4384080"/>
+            <a:ext cx="9071280" cy="4383720"/>
           </a:xfrm>
           <a:prstGeom prst="rect">
             <a:avLst/>
@@ -3643,7 +3667,7 @@
             <a:normAutofit fontScale="86000"/>
           </a:bodyPr>
           <a:p>
-            <a:pPr marL="432000" indent="-323640">
+            <a:pPr marL="432000" indent="-323280">
               <a:lnSpc>
                 <a:spcPct val="100000"/>
               </a:lnSpc>
@@ -3659,7 +3683,11 @@
             </a:pPr>
             <a:r>
               <a:rPr b="0" lang="en-US" sz="2600" spc="-1" strike="noStrike">
-                <a:latin typeface="Arial"/>
+                <a:solidFill>
+                  <a:srgbClr val="000000"/>
+                </a:solidFill>
+                <a:latin typeface="Arial"/>
+                <a:ea typeface="DejaVu Sans"/>
               </a:rPr>
               <a:t>We first create Entity Framework. This is done by installing it from “Manage NuGet Packages” option.</a:t>
             </a:r>
@@ -3668,7 +3696,7 @@
             </a:endParaRPr>
           </a:p>
           <a:p>
-            <a:pPr marL="432000" indent="-323640">
+            <a:pPr marL="432000" indent="-323280">
               <a:lnSpc>
                 <a:spcPct val="100000"/>
               </a:lnSpc>
@@ -3684,7 +3712,11 @@
             </a:pPr>
             <a:r>
               <a:rPr b="0" lang="en-US" sz="2600" spc="-1" strike="noStrike">
-                <a:latin typeface="Arial"/>
+                <a:solidFill>
+                  <a:srgbClr val="000000"/>
+                </a:solidFill>
+                <a:latin typeface="Arial"/>
+                <a:ea typeface="DejaVu Sans"/>
               </a:rPr>
               <a:t> </a:t>
             </a:r>
@@ -3693,7 +3725,7 @@
             </a:endParaRPr>
           </a:p>
           <a:p>
-            <a:pPr marL="432000" indent="-323640">
+            <a:pPr marL="432000" indent="-323280">
               <a:lnSpc>
                 <a:spcPct val="100000"/>
               </a:lnSpc>
@@ -3709,7 +3741,11 @@
             </a:pPr>
             <a:r>
               <a:rPr b="0" lang="en-US" sz="2600" spc="-1" strike="noStrike">
-                <a:latin typeface="Arial"/>
+                <a:solidFill>
+                  <a:srgbClr val="000000"/>
+                </a:solidFill>
+                <a:latin typeface="Arial"/>
+                <a:ea typeface="DejaVu Sans"/>
               </a:rPr>
               <a:t>Entity Framework is an open source object-relational mapping framework for ADO.NET.</a:t>
             </a:r>
@@ -3718,7 +3754,7 @@
             </a:endParaRPr>
           </a:p>
           <a:p>
-            <a:pPr marL="432000" indent="-323640">
+            <a:pPr marL="432000" indent="-323280">
               <a:lnSpc>
                 <a:spcPct val="100000"/>
               </a:lnSpc>
@@ -3734,7 +3770,11 @@
             </a:pPr>
             <a:r>
               <a:rPr b="0" lang="en-US" sz="2600" spc="-1" strike="noStrike">
-                <a:latin typeface="Arial"/>
+                <a:solidFill>
+                  <a:srgbClr val="000000"/>
+                </a:solidFill>
+                <a:latin typeface="Arial"/>
+                <a:ea typeface="DejaVu Sans"/>
               </a:rPr>
               <a:t> </a:t>
             </a:r>
@@ -3743,7 +3783,7 @@
             </a:endParaRPr>
           </a:p>
           <a:p>
-            <a:pPr marL="432000" indent="-323640">
+            <a:pPr marL="432000" indent="-323280">
               <a:lnSpc>
                 <a:spcPct val="100000"/>
               </a:lnSpc>
@@ -3759,7 +3799,11 @@
             </a:pPr>
             <a:r>
               <a:rPr b="0" lang="en-US" sz="2600" spc="-1" strike="noStrike">
-                <a:latin typeface="Arial"/>
+                <a:solidFill>
+                  <a:srgbClr val="000000"/>
+                </a:solidFill>
+                <a:latin typeface="Arial"/>
+                <a:ea typeface="DejaVu Sans"/>
               </a:rPr>
               <a:t>ORM is defined as a technique for converting data between incompatible type systems using object-oriented programming languages. This creates, in effect, a "virtual object database" that can be used from within the programming language.</a:t>
             </a:r>
@@ -3808,7 +3852,7 @@
         <p:spPr>
           <a:xfrm>
             <a:off x="504000" y="576000"/>
-            <a:ext cx="7199640" cy="719640"/>
+            <a:ext cx="7199280" cy="719280"/>
           </a:xfrm>
           <a:prstGeom prst="rect">
             <a:avLst/>
@@ -3834,7 +3878,7 @@
         <p:spPr>
           <a:xfrm>
             <a:off x="504000" y="1800000"/>
-            <a:ext cx="9071640" cy="4384080"/>
+            <a:ext cx="9071280" cy="4383720"/>
           </a:xfrm>
           <a:prstGeom prst="rect">
             <a:avLst/>
@@ -3855,7 +3899,7 @@
             <a:normAutofit/>
           </a:bodyPr>
           <a:p>
-            <a:pPr marL="432000" indent="-323640">
+            <a:pPr marL="432000" indent="-323280">
               <a:lnSpc>
                 <a:spcPct val="100000"/>
               </a:lnSpc>
@@ -3871,7 +3915,11 @@
             </a:pPr>
             <a:r>
               <a:rPr b="0" lang="en-US" sz="2600" spc="-1" strike="noStrike">
-                <a:latin typeface="Arial"/>
+                <a:solidFill>
+                  <a:srgbClr val="000000"/>
+                </a:solidFill>
+                <a:latin typeface="Arial"/>
+                <a:ea typeface="DejaVu Sans"/>
               </a:rPr>
               <a:t>We then create models:</a:t>
             </a:r>
@@ -3880,7 +3928,7 @@
             </a:endParaRPr>
           </a:p>
           <a:p>
-            <a:pPr marL="432000" indent="-323640">
+            <a:pPr marL="432000" indent="-323280">
               <a:lnSpc>
                 <a:spcPct val="100000"/>
               </a:lnSpc>
@@ -3896,7 +3944,11 @@
             </a:pPr>
             <a:r>
               <a:rPr b="0" lang="en-US" sz="2600" spc="-1" strike="noStrike">
-                <a:latin typeface="Arial"/>
+                <a:solidFill>
+                  <a:srgbClr val="000000"/>
+                </a:solidFill>
+                <a:latin typeface="Arial"/>
+                <a:ea typeface="DejaVu Sans"/>
               </a:rPr>
               <a:t>SalesRegion: Name, Code.</a:t>
             </a:r>
@@ -3905,7 +3957,7 @@
             </a:endParaRPr>
           </a:p>
           <a:p>
-            <a:pPr marL="432000" indent="-323640">
+            <a:pPr marL="432000" indent="-323280">
               <a:lnSpc>
                 <a:spcPct val="100000"/>
               </a:lnSpc>
@@ -3921,7 +3973,11 @@
             </a:pPr>
             <a:r>
               <a:rPr b="0" lang="en-US" sz="2600" spc="-1" strike="noStrike">
-                <a:latin typeface="Arial"/>
+                <a:solidFill>
+                  <a:srgbClr val="000000"/>
+                </a:solidFill>
+                <a:latin typeface="Arial"/>
+                <a:ea typeface="DejaVu Sans"/>
               </a:rPr>
               <a:t>SalesPerson: Firstname, Lastname.</a:t>
             </a:r>
@@ -3930,7 +3986,7 @@
             </a:endParaRPr>
           </a:p>
           <a:p>
-            <a:pPr marL="432000" indent="-323640">
+            <a:pPr marL="432000" indent="-323280">
               <a:lnSpc>
                 <a:spcPct val="100000"/>
               </a:lnSpc>
@@ -3946,7 +4002,11 @@
             </a:pPr>
             <a:r>
               <a:rPr b="0" lang="en-US" sz="2600" spc="-1" strike="noStrike">
-                <a:latin typeface="Arial"/>
+                <a:solidFill>
+                  <a:srgbClr val="000000"/>
+                </a:solidFill>
+                <a:latin typeface="Arial"/>
+                <a:ea typeface="DejaVu Sans"/>
               </a:rPr>
               <a:t>Sales: Amount, Date.</a:t>
             </a:r>
@@ -3955,7 +4015,7 @@
             </a:endParaRPr>
           </a:p>
           <a:p>
-            <a:pPr marL="432000" indent="-323640">
+            <a:pPr marL="432000" indent="-323280">
               <a:lnSpc>
                 <a:spcPct val="100000"/>
               </a:lnSpc>
@@ -3971,7 +4031,11 @@
             </a:pPr>
             <a:r>
               <a:rPr b="0" lang="en-US" sz="2600" spc="-1" strike="noStrike">
-                <a:latin typeface="Arial"/>
+                <a:solidFill>
+                  <a:srgbClr val="000000"/>
+                </a:solidFill>
+                <a:latin typeface="Arial"/>
+                <a:ea typeface="DejaVu Sans"/>
               </a:rPr>
               <a:t>Base Model: Id, CreatedBy, CreatedDate,UpdatedBy, UpdatedDate.</a:t>
             </a:r>
@@ -4013,14 +4077,14 @@
       </p:grpSpPr>
       <p:sp>
         <p:nvSpPr>
-          <p:cNvPr id="86" name="TextShape 1"/>
-          <p:cNvSpPr txBox="1"/>
+          <p:cNvPr id="86" name="CustomShape 1"/>
+          <p:cNvSpPr/>
           <p:nvPr/>
         </p:nvSpPr>
         <p:spPr>
           <a:xfrm>
             <a:off x="504000" y="304920"/>
-            <a:ext cx="7199640" cy="1262160"/>
+            <a:ext cx="7199280" cy="1261800"/>
           </a:xfrm>
           <a:prstGeom prst="rect">
             <a:avLst/>
@@ -4030,28 +4094,23 @@
             <a:noFill/>
           </a:ln>
         </p:spPr>
-        <p:txBody>
-          <a:bodyPr lIns="0" rIns="0" tIns="0" bIns="0" anchor="ctr">
-            <a:spAutoFit/>
-          </a:bodyPr>
-          <a:p>
-            <a:pPr algn="ctr"/>
-            <a:endParaRPr b="0" lang="en-US" sz="4400" spc="-1" strike="noStrike">
-              <a:latin typeface="Arial"/>
-            </a:endParaRPr>
-          </a:p>
-        </p:txBody>
-      </p:sp>
-      <p:sp>
-        <p:nvSpPr>
-          <p:cNvPr id="87" name="TextShape 2"/>
-          <p:cNvSpPr txBox="1"/>
+        <p:style>
+          <a:lnRef idx="0"/>
+          <a:fillRef idx="0"/>
+          <a:effectRef idx="0"/>
+          <a:fontRef idx="minor"/>
+        </p:style>
+      </p:sp>
+      <p:sp>
+        <p:nvSpPr>
+          <p:cNvPr id="87" name="CustomShape 2"/>
+          <p:cNvSpPr/>
           <p:nvPr/>
         </p:nvSpPr>
         <p:spPr>
           <a:xfrm>
             <a:off x="548640" y="2194560"/>
-            <a:ext cx="8869680" cy="3657600"/>
+            <a:ext cx="8869320" cy="2833560"/>
           </a:xfrm>
           <a:prstGeom prst="rect">
             <a:avLst/>
@@ -4061,11 +4120,22 @@
             <a:noFill/>
           </a:ln>
         </p:spPr>
+        <p:style>
+          <a:lnRef idx="0"/>
+          <a:fillRef idx="0"/>
+          <a:effectRef idx="0"/>
+          <a:fontRef idx="minor"/>
+        </p:style>
         <p:txBody>
           <a:bodyPr lIns="90000" rIns="90000" tIns="45000" bIns="45000">
             <a:spAutoFit/>
           </a:bodyPr>
           <a:p>
+            <a:pPr>
+              <a:lnSpc>
+                <a:spcPct val="100000"/>
+              </a:lnSpc>
+            </a:pPr>
             <a:r>
               <a:rPr b="0" lang="en-US" sz="1800" spc="-1" strike="noStrike">
                 <a:latin typeface="Arial"/>
@@ -4077,11 +4147,21 @@
             </a:endParaRPr>
           </a:p>
           <a:p>
+            <a:pPr>
+              <a:lnSpc>
+                <a:spcPct val="100000"/>
+              </a:lnSpc>
+            </a:pPr>
             <a:endParaRPr b="0" lang="en-US" sz="1800" spc="-1" strike="noStrike">
               <a:latin typeface="Arial"/>
             </a:endParaRPr>
           </a:p>
           <a:p>
+            <a:pPr>
+              <a:lnSpc>
+                <a:spcPct val="100000"/>
+              </a:lnSpc>
+            </a:pPr>
             <a:r>
               <a:rPr b="0" lang="en-US" sz="1800" spc="-1" strike="noStrike">
                 <a:latin typeface="Arial"/>
@@ -4093,11 +4173,21 @@
             </a:endParaRPr>
           </a:p>
           <a:p>
+            <a:pPr>
+              <a:lnSpc>
+                <a:spcPct val="100000"/>
+              </a:lnSpc>
+            </a:pPr>
             <a:endParaRPr b="0" lang="en-US" sz="1800" spc="-1" strike="noStrike">
               <a:latin typeface="Arial"/>
             </a:endParaRPr>
           </a:p>
           <a:p>
+            <a:pPr>
+              <a:lnSpc>
+                <a:spcPct val="100000"/>
+              </a:lnSpc>
+            </a:pPr>
             <a:r>
               <a:rPr b="0" lang="en-US" sz="1800" spc="-1" strike="noStrike">
                 <a:latin typeface="Arial"/>
@@ -4109,6 +4199,11 @@
             </a:endParaRPr>
           </a:p>
           <a:p>
+            <a:pPr>
+              <a:lnSpc>
+                <a:spcPct val="100000"/>
+              </a:lnSpc>
+            </a:pPr>
             <a:r>
               <a:rPr b="0" lang="en-US" sz="1800" spc="-1" strike="noStrike">
                 <a:latin typeface="Arial"/>
@@ -4120,6 +4215,11 @@
             </a:endParaRPr>
           </a:p>
           <a:p>
+            <a:pPr>
+              <a:lnSpc>
+                <a:spcPct val="100000"/>
+              </a:lnSpc>
+            </a:pPr>
             <a:r>
               <a:rPr b="0" lang="en-US" sz="1800" spc="-1" strike="noStrike">
                 <a:latin typeface="Arial"/>
@@ -4131,11 +4231,21 @@
             </a:endParaRPr>
           </a:p>
           <a:p>
+            <a:pPr>
+              <a:lnSpc>
+                <a:spcPct val="100000"/>
+              </a:lnSpc>
+            </a:pPr>
             <a:endParaRPr b="0" lang="en-US" sz="1800" spc="-1" strike="noStrike">
               <a:latin typeface="Arial"/>
             </a:endParaRPr>
           </a:p>
           <a:p>
+            <a:pPr>
+              <a:lnSpc>
+                <a:spcPct val="100000"/>
+              </a:lnSpc>
+            </a:pPr>
             <a:r>
               <a:rPr b="0" lang="en-US" sz="1800" spc="-1" strike="noStrike">
                 <a:latin typeface="Arial"/>
@@ -4180,14 +4290,14 @@
       </p:grpSpPr>
       <p:sp>
         <p:nvSpPr>
-          <p:cNvPr id="88" name="TextShape 1"/>
-          <p:cNvSpPr txBox="1"/>
+          <p:cNvPr id="88" name="CustomShape 1"/>
+          <p:cNvSpPr/>
           <p:nvPr/>
         </p:nvSpPr>
         <p:spPr>
           <a:xfrm>
             <a:off x="504000" y="304920"/>
-            <a:ext cx="7199640" cy="1262160"/>
+            <a:ext cx="7199280" cy="1261800"/>
           </a:xfrm>
           <a:prstGeom prst="rect">
             <a:avLst/>
@@ -4197,28 +4307,23 @@
             <a:noFill/>
           </a:ln>
         </p:spPr>
-        <p:txBody>
-          <a:bodyPr lIns="0" rIns="0" tIns="0" bIns="0" anchor="ctr">
-            <a:spAutoFit/>
-          </a:bodyPr>
-          <a:p>
-            <a:pPr algn="ctr"/>
-            <a:endParaRPr b="0" lang="en-US" sz="4400" spc="-1" strike="noStrike">
-              <a:latin typeface="Arial"/>
-            </a:endParaRPr>
-          </a:p>
-        </p:txBody>
-      </p:sp>
-      <p:sp>
-        <p:nvSpPr>
-          <p:cNvPr id="89" name="TextShape 2"/>
-          <p:cNvSpPr txBox="1"/>
+        <p:style>
+          <a:lnRef idx="0"/>
+          <a:fillRef idx="0"/>
+          <a:effectRef idx="0"/>
+          <a:fontRef idx="minor"/>
+        </p:style>
+      </p:sp>
+      <p:sp>
+        <p:nvSpPr>
+          <p:cNvPr id="89" name="CustomShape 2"/>
+          <p:cNvSpPr/>
           <p:nvPr/>
         </p:nvSpPr>
         <p:spPr>
           <a:xfrm>
             <a:off x="548640" y="1828800"/>
-            <a:ext cx="8961120" cy="1882080"/>
+            <a:ext cx="8961120" cy="3382200"/>
           </a:xfrm>
           <a:prstGeom prst="rect">
             <a:avLst/>
@@ -4228,11 +4333,22 @@
             <a:noFill/>
           </a:ln>
         </p:spPr>
+        <p:style>
+          <a:lnRef idx="0"/>
+          <a:fillRef idx="0"/>
+          <a:effectRef idx="0"/>
+          <a:fontRef idx="minor"/>
+        </p:style>
         <p:txBody>
           <a:bodyPr lIns="90000" rIns="90000" tIns="45000" bIns="45000">
             <a:spAutoFit/>
           </a:bodyPr>
           <a:p>
+            <a:pPr>
+              <a:lnSpc>
+                <a:spcPct val="100000"/>
+              </a:lnSpc>
+            </a:pPr>
             <a:r>
               <a:rPr b="0" lang="en-US" sz="1800" spc="-1" strike="noStrike">
                 <a:latin typeface="Arial"/>
@@ -4244,11 +4360,21 @@
             </a:endParaRPr>
           </a:p>
           <a:p>
+            <a:pPr>
+              <a:lnSpc>
+                <a:spcPct val="100000"/>
+              </a:lnSpc>
+            </a:pPr>
             <a:endParaRPr b="0" lang="en-US" sz="1800" spc="-1" strike="noStrike">
               <a:latin typeface="Arial"/>
             </a:endParaRPr>
           </a:p>
           <a:p>
+            <a:pPr>
+              <a:lnSpc>
+                <a:spcPct val="100000"/>
+              </a:lnSpc>
+            </a:pPr>
             <a:r>
               <a:rPr b="0" lang="en-US" sz="1800" spc="-1" strike="noStrike">
                 <a:latin typeface="Arial"/>
@@ -4260,39 +4386,590 @@
             </a:endParaRPr>
           </a:p>
           <a:p>
+            <a:pPr>
+              <a:lnSpc>
+                <a:spcPct val="100000"/>
+              </a:lnSpc>
+            </a:pPr>
             <a:endParaRPr b="0" lang="en-US" sz="1800" spc="-1" strike="noStrike">
               <a:latin typeface="Arial"/>
             </a:endParaRPr>
           </a:p>
           <a:p>
+            <a:pPr>
+              <a:lnSpc>
+                <a:spcPct val="100000"/>
+              </a:lnSpc>
+            </a:pPr>
             <a:r>
               <a:rPr b="0" lang="en-US" sz="1800" spc="-1" strike="noStrike">
                 <a:latin typeface="Arial"/>
               </a:rPr>
-              <a:t>Few of the types of Data annotations are:</a:t>
+              <a:t>Few of the types of Data annotations used in this application are:</a:t>
             </a:r>
             <a:endParaRPr b="0" lang="en-US" sz="1800" spc="-1" strike="noStrike">
               <a:latin typeface="Arial"/>
             </a:endParaRPr>
           </a:p>
           <a:p>
+            <a:pPr>
+              <a:lnSpc>
+                <a:spcPct val="100000"/>
+              </a:lnSpc>
+            </a:pPr>
             <a:endParaRPr b="0" lang="en-US" sz="1800" spc="-1" strike="noStrike">
               <a:latin typeface="Arial"/>
             </a:endParaRPr>
           </a:p>
           <a:p>
+            <a:pPr>
+              <a:lnSpc>
+                <a:spcPct val="100000"/>
+              </a:lnSpc>
+            </a:pPr>
             <a:r>
               <a:rPr b="0" lang="en-US" sz="1800" spc="-1" strike="noStrike">
                 <a:latin typeface="Arial"/>
               </a:rPr>
-              <a:t>Required - </a:t>
+              <a:t>Required - This attribute specifies that the value is mandatory and cannot be skipped.</a:t>
             </a:r>
             <a:endParaRPr b="0" lang="en-US" sz="1800" spc="-1" strike="noStrike">
               <a:latin typeface="Arial"/>
             </a:endParaRPr>
           </a:p>
-        </p:txBody>
-      </p:sp>
+          <a:p>
+            <a:pPr>
+              <a:lnSpc>
+                <a:spcPct val="100000"/>
+              </a:lnSpc>
+            </a:pPr>
+            <a:endParaRPr b="0" lang="en-US" sz="1800" spc="-1" strike="noStrike">
+              <a:latin typeface="Arial"/>
+            </a:endParaRPr>
+          </a:p>
+          <a:p>
+            <a:pPr>
+              <a:lnSpc>
+                <a:spcPct val="100000"/>
+              </a:lnSpc>
+            </a:pPr>
+            <a:r>
+              <a:rPr b="0" lang="en-US" sz="1800" spc="-1" strike="noStrike">
+                <a:latin typeface="Arial"/>
+              </a:rPr>
+              <a:t>StringLength() - Using this attribute we can specify maximum and minimum length of the property.</a:t>
+            </a:r>
+            <a:endParaRPr b="0" lang="en-US" sz="1800" spc="-1" strike="noStrike">
+              <a:latin typeface="Arial"/>
+            </a:endParaRPr>
+          </a:p>
+          <a:p>
+            <a:pPr>
+              <a:lnSpc>
+                <a:spcPct val="100000"/>
+              </a:lnSpc>
+            </a:pPr>
+            <a:endParaRPr b="0" lang="en-US" sz="1800" spc="-1" strike="noStrike">
+              <a:latin typeface="Arial"/>
+            </a:endParaRPr>
+          </a:p>
+          <a:p>
+            <a:pPr>
+              <a:lnSpc>
+                <a:spcPct val="100000"/>
+              </a:lnSpc>
+            </a:pPr>
+            <a:r>
+              <a:rPr b="0" lang="en-US" sz="1800" spc="-1" strike="noStrike">
+                <a:latin typeface="Arial"/>
+              </a:rPr>
+              <a:t>Range() - Using this attribute we can set a range between two numbers.</a:t>
+            </a:r>
+            <a:endParaRPr b="0" lang="en-US" sz="1800" spc="-1" strike="noStrike">
+              <a:latin typeface="Arial"/>
+            </a:endParaRPr>
+          </a:p>
+        </p:txBody>
+      </p:sp>
+      <p:pic>
+        <p:nvPicPr>
+          <p:cNvPr id="90" name="" descr=""/>
+          <p:cNvPicPr/>
+          <p:nvPr/>
+        </p:nvPicPr>
+        <p:blipFill>
+          <a:blip r:embed="rId1"/>
+          <a:stretch/>
+        </p:blipFill>
+        <p:spPr>
+          <a:xfrm>
+            <a:off x="789120" y="5760720"/>
+            <a:ext cx="3234240" cy="750960"/>
+          </a:xfrm>
+          <a:prstGeom prst="rect">
+            <a:avLst/>
+          </a:prstGeom>
+          <a:ln>
+            <a:noFill/>
+          </a:ln>
+        </p:spPr>
+      </p:pic>
+      <p:pic>
+        <p:nvPicPr>
+          <p:cNvPr id="91" name="" descr=""/>
+          <p:cNvPicPr/>
+          <p:nvPr/>
+        </p:nvPicPr>
+        <p:blipFill>
+          <a:blip r:embed="rId2"/>
+          <a:stretch/>
+        </p:blipFill>
+        <p:spPr>
+          <a:xfrm>
+            <a:off x="4910400" y="5714640"/>
+            <a:ext cx="2953440" cy="790560"/>
+          </a:xfrm>
+          <a:prstGeom prst="rect">
+            <a:avLst/>
+          </a:prstGeom>
+          <a:ln>
+            <a:noFill/>
+          </a:ln>
+        </p:spPr>
+      </p:pic>
+    </p:spTree>
+  </p:cSld>
+  <mc:AlternateContent>
+    <mc:Choice Requires="p14">
+      <p:transition spd="slow" p14:dur="2000"/>
+    </mc:Choice>
+    <mc:Fallback>
+      <p:transition spd="slow"/>
+    </mc:Fallback>
+  </mc:AlternateContent>
+</p:sld>
+</file>
+
+<file path=ppt/slides/slide7.xml><?xml version="1.0" encoding="utf-8"?>
+<p:sld xmlns:a="http://schemas.openxmlformats.org/drawingml/2006/main" xmlns:p="http://schemas.openxmlformats.org/presentationml/2006/main" xmlns:r="http://schemas.openxmlformats.org/officeDocument/2006/relationships" xmlns:p14="http://schemas.microsoft.com/office/powerpoint/2010/main" xmlns:p15="http://schemas.microsoft.com/office/powerpoint/2012/main" xmlns:mc="http://schemas.openxmlformats.org/markup-compatibility/2006">
+  <p:cSld>
+    <p:spTree>
+      <p:nvGrpSpPr>
+        <p:cNvPr id="1" name=""/>
+        <p:cNvGrpSpPr/>
+        <p:nvPr/>
+      </p:nvGrpSpPr>
+      <p:grpSpPr>
+        <a:xfrm>
+          <a:off x="0" y="0"/>
+          <a:ext cx="0" cy="0"/>
+          <a:chOff x="0" y="0"/>
+          <a:chExt cx="0" cy="0"/>
+        </a:xfrm>
+      </p:grpSpPr>
+      <p:sp>
+        <p:nvSpPr>
+          <p:cNvPr id="92" name="TextShape 1"/>
+          <p:cNvSpPr txBox="1"/>
+          <p:nvPr/>
+        </p:nvSpPr>
+        <p:spPr>
+          <a:xfrm>
+            <a:off x="457200" y="1554480"/>
+            <a:ext cx="9144000" cy="3673800"/>
+          </a:xfrm>
+          <a:prstGeom prst="rect">
+            <a:avLst/>
+          </a:prstGeom>
+          <a:noFill/>
+          <a:ln>
+            <a:noFill/>
+          </a:ln>
+        </p:spPr>
+        <p:txBody>
+          <a:bodyPr lIns="90000" rIns="90000" tIns="45000" bIns="45000">
+            <a:spAutoFit/>
+          </a:bodyPr>
+          <a:p>
+            <a:r>
+              <a:rPr b="0" lang="en-US" sz="1800" spc="-1" strike="noStrike">
+                <a:latin typeface="Arial"/>
+              </a:rPr>
+              <a:t>The relationship between models are defined.</a:t>
+            </a:r>
+            <a:endParaRPr b="0" lang="en-US" sz="1800" spc="-1" strike="noStrike">
+              <a:latin typeface="Arial"/>
+            </a:endParaRPr>
+          </a:p>
+          <a:p>
+            <a:r>
+              <a:rPr b="0" lang="en-US" sz="1800" spc="-1" strike="noStrike">
+                <a:latin typeface="Arial"/>
+              </a:rPr>
+              <a:t>The types of relationships -</a:t>
+            </a:r>
+            <a:endParaRPr b="0" lang="en-US" sz="1800" spc="-1" strike="noStrike">
+              <a:latin typeface="Arial"/>
+            </a:endParaRPr>
+          </a:p>
+          <a:p>
+            <a:r>
+              <a:rPr b="0" lang="en-US" sz="1800" spc="-1" strike="noStrike">
+                <a:latin typeface="Arial"/>
+              </a:rPr>
+              <a:t>One-to-One : A row in a table can have only one matching row in another table, and vice versa.</a:t>
+            </a:r>
+            <a:endParaRPr b="0" lang="en-US" sz="1800" spc="-1" strike="noStrike">
+              <a:latin typeface="Arial"/>
+            </a:endParaRPr>
+          </a:p>
+          <a:p>
+            <a:endParaRPr b="0" lang="en-US" sz="1800" spc="-1" strike="noStrike">
+              <a:latin typeface="Arial"/>
+            </a:endParaRPr>
+          </a:p>
+          <a:p>
+            <a:r>
+              <a:rPr b="0" lang="en-US" sz="1800" spc="-1" strike="noStrike">
+                <a:latin typeface="Arial"/>
+              </a:rPr>
+              <a:t>One-to-Many (or Many-to-One) : A row in a table can have many matching rows in another table, but a row in the second table can have only one matching row in first table.</a:t>
+            </a:r>
+            <a:endParaRPr b="0" lang="en-US" sz="1800" spc="-1" strike="noStrike">
+              <a:latin typeface="Arial"/>
+            </a:endParaRPr>
+          </a:p>
+          <a:p>
+            <a:endParaRPr b="0" lang="en-US" sz="1800" spc="-1" strike="noStrike">
+              <a:latin typeface="Arial"/>
+            </a:endParaRPr>
+          </a:p>
+          <a:p>
+            <a:r>
+              <a:rPr b="0" lang="en-US" sz="1800" spc="-1" strike="noStrike">
+                <a:latin typeface="Arial"/>
+              </a:rPr>
+              <a:t>Many-to-Many : A row in a table can have many matching rows in another table, and vice versa.</a:t>
+            </a:r>
+            <a:endParaRPr b="0" lang="en-US" sz="1800" spc="-1" strike="noStrike">
+              <a:latin typeface="Arial"/>
+            </a:endParaRPr>
+          </a:p>
+          <a:p>
+            <a:endParaRPr b="0" lang="en-US" sz="1800" spc="-1" strike="noStrike">
+              <a:latin typeface="Arial"/>
+            </a:endParaRPr>
+          </a:p>
+          <a:p>
+            <a:endParaRPr b="0" lang="en-US" sz="1800" spc="-1" strike="noStrike">
+              <a:latin typeface="Arial"/>
+            </a:endParaRPr>
+          </a:p>
+          <a:p>
+            <a:r>
+              <a:rPr b="0" lang="en-US" sz="1800" spc="-1" strike="noStrike">
+                <a:latin typeface="Arial"/>
+              </a:rPr>
+              <a:t>Ex – This Is an example of one-2-one relationship.</a:t>
+            </a:r>
+            <a:endParaRPr b="0" lang="en-US" sz="1800" spc="-1" strike="noStrike">
+              <a:latin typeface="Arial"/>
+            </a:endParaRPr>
+          </a:p>
+        </p:txBody>
+      </p:sp>
+      <p:pic>
+        <p:nvPicPr>
+          <p:cNvPr id="93" name="" descr=""/>
+          <p:cNvPicPr/>
+          <p:nvPr/>
+        </p:nvPicPr>
+        <p:blipFill>
+          <a:blip r:embed="rId1"/>
+          <a:stretch/>
+        </p:blipFill>
+        <p:spPr>
+          <a:xfrm>
+            <a:off x="1653840" y="5370120"/>
+            <a:ext cx="4381200" cy="939240"/>
+          </a:xfrm>
+          <a:prstGeom prst="rect">
+            <a:avLst/>
+          </a:prstGeom>
+          <a:ln>
+            <a:noFill/>
+          </a:ln>
+        </p:spPr>
+      </p:pic>
+    </p:spTree>
+  </p:cSld>
+  <mc:AlternateContent>
+    <mc:Choice Requires="p14">
+      <p:transition spd="slow" p14:dur="2000"/>
+    </mc:Choice>
+    <mc:Fallback>
+      <p:transition spd="slow"/>
+    </mc:Fallback>
+  </mc:AlternateContent>
+</p:sld>
+</file>
+
+<file path=ppt/slides/slide8.xml><?xml version="1.0" encoding="utf-8"?>
+<p:sld xmlns:a="http://schemas.openxmlformats.org/drawingml/2006/main" xmlns:p="http://schemas.openxmlformats.org/presentationml/2006/main" xmlns:r="http://schemas.openxmlformats.org/officeDocument/2006/relationships" xmlns:p14="http://schemas.microsoft.com/office/powerpoint/2010/main" xmlns:p15="http://schemas.microsoft.com/office/powerpoint/2012/main" xmlns:mc="http://schemas.openxmlformats.org/markup-compatibility/2006">
+  <p:cSld>
+    <p:spTree>
+      <p:nvGrpSpPr>
+        <p:cNvPr id="1" name=""/>
+        <p:cNvGrpSpPr/>
+        <p:nvPr/>
+      </p:nvGrpSpPr>
+      <p:grpSpPr>
+        <a:xfrm>
+          <a:off x="0" y="0"/>
+          <a:ext cx="0" cy="0"/>
+          <a:chOff x="0" y="0"/>
+          <a:chExt cx="0" cy="0"/>
+        </a:xfrm>
+      </p:grpSpPr>
+      <p:sp>
+        <p:nvSpPr>
+          <p:cNvPr id="94" name="TextShape 1"/>
+          <p:cNvSpPr txBox="1"/>
+          <p:nvPr/>
+        </p:nvSpPr>
+        <p:spPr>
+          <a:xfrm>
+            <a:off x="457200" y="1554480"/>
+            <a:ext cx="9052560" cy="2649960"/>
+          </a:xfrm>
+          <a:prstGeom prst="rect">
+            <a:avLst/>
+          </a:prstGeom>
+          <a:noFill/>
+          <a:ln>
+            <a:noFill/>
+          </a:ln>
+        </p:spPr>
+        <p:txBody>
+          <a:bodyPr lIns="90000" rIns="90000" tIns="45000" bIns="45000">
+            <a:spAutoFit/>
+          </a:bodyPr>
+          <a:p>
+            <a:r>
+              <a:rPr b="0" lang="en-US" sz="1800" spc="-1" strike="noStrike">
+                <a:latin typeface="Arial"/>
+              </a:rPr>
+              <a:t>Data context are created to generate a database.</a:t>
+            </a:r>
+            <a:endParaRPr b="0" lang="en-US" sz="1800" spc="-1" strike="noStrike">
+              <a:latin typeface="Arial"/>
+            </a:endParaRPr>
+          </a:p>
+          <a:p>
+            <a:endParaRPr b="0" lang="en-US" sz="1800" spc="-1" strike="noStrike">
+              <a:latin typeface="Arial"/>
+            </a:endParaRPr>
+          </a:p>
+          <a:p>
+            <a:r>
+              <a:rPr b="0" lang="en-US" sz="1800" spc="-1" strike="noStrike">
+                <a:latin typeface="Arial"/>
+              </a:rPr>
+              <a:t>This data context is a primary class responsible for interacting with the database.</a:t>
+            </a:r>
+            <a:endParaRPr b="0" lang="en-US" sz="1800" spc="-1" strike="noStrike">
+              <a:latin typeface="Arial"/>
+            </a:endParaRPr>
+          </a:p>
+          <a:p>
+            <a:r>
+              <a:rPr b="0" lang="en-US" sz="1800" spc="-1" strike="noStrike">
+                <a:latin typeface="Arial"/>
+              </a:rPr>
+              <a:t>The gap between entity class/ domain and database are bridged.</a:t>
+            </a:r>
+            <a:endParaRPr b="0" lang="en-US" sz="1800" spc="-1" strike="noStrike">
+              <a:latin typeface="Arial"/>
+            </a:endParaRPr>
+          </a:p>
+          <a:p>
+            <a:endParaRPr b="0" lang="en-US" sz="1800" spc="-1" strike="noStrike">
+              <a:latin typeface="Arial"/>
+            </a:endParaRPr>
+          </a:p>
+          <a:p>
+            <a:r>
+              <a:rPr b="0" lang="en-US" sz="1800" spc="-1" strike="noStrike">
+                <a:latin typeface="Arial"/>
+              </a:rPr>
+              <a:t>The context class is used to query or save data to the database. It is also used to configure domain classes, database related mappings, change tracking settings, caching, transaction etc.</a:t>
+            </a:r>
+            <a:endParaRPr b="0" lang="en-US" sz="1800" spc="-1" strike="noStrike">
+              <a:latin typeface="Arial"/>
+            </a:endParaRPr>
+          </a:p>
+          <a:p>
+            <a:endParaRPr b="0" lang="en-US" sz="1800" spc="-1" strike="noStrike">
+              <a:latin typeface="Arial"/>
+            </a:endParaRPr>
+          </a:p>
+          <a:p>
+            <a:r>
+              <a:rPr b="0" lang="en-US" sz="1800" spc="-1" strike="noStrike">
+                <a:latin typeface="Arial"/>
+              </a:rPr>
+              <a:t>Overriding (if necessary) are done here.</a:t>
+            </a:r>
+            <a:endParaRPr b="0" lang="en-US" sz="1800" spc="-1" strike="noStrike">
+              <a:latin typeface="Arial"/>
+            </a:endParaRPr>
+          </a:p>
+        </p:txBody>
+      </p:sp>
+      <p:pic>
+        <p:nvPicPr>
+          <p:cNvPr id="95" name="" descr=""/>
+          <p:cNvPicPr/>
+          <p:nvPr/>
+        </p:nvPicPr>
+        <p:blipFill>
+          <a:blip r:embed="rId1"/>
+          <a:stretch/>
+        </p:blipFill>
+        <p:spPr>
+          <a:xfrm>
+            <a:off x="585720" y="4744080"/>
+            <a:ext cx="8832600" cy="1656720"/>
+          </a:xfrm>
+          <a:prstGeom prst="rect">
+            <a:avLst/>
+          </a:prstGeom>
+          <a:ln>
+            <a:noFill/>
+          </a:ln>
+        </p:spPr>
+      </p:pic>
+    </p:spTree>
+  </p:cSld>
+  <mc:AlternateContent>
+    <mc:Choice Requires="p14">
+      <p:transition spd="slow" p14:dur="2000"/>
+    </mc:Choice>
+    <mc:Fallback>
+      <p:transition spd="slow"/>
+    </mc:Fallback>
+  </mc:AlternateContent>
+</p:sld>
+</file>
+
+<file path=ppt/slides/slide9.xml><?xml version="1.0" encoding="utf-8"?>
+<p:sld xmlns:a="http://schemas.openxmlformats.org/drawingml/2006/main" xmlns:p="http://schemas.openxmlformats.org/presentationml/2006/main" xmlns:r="http://schemas.openxmlformats.org/officeDocument/2006/relationships" xmlns:p14="http://schemas.microsoft.com/office/powerpoint/2010/main" xmlns:p15="http://schemas.microsoft.com/office/powerpoint/2012/main" xmlns:mc="http://schemas.openxmlformats.org/markup-compatibility/2006">
+  <p:cSld>
+    <p:spTree>
+      <p:nvGrpSpPr>
+        <p:cNvPr id="1" name=""/>
+        <p:cNvGrpSpPr/>
+        <p:nvPr/>
+      </p:nvGrpSpPr>
+      <p:grpSpPr>
+        <a:xfrm>
+          <a:off x="0" y="0"/>
+          <a:ext cx="0" cy="0"/>
+          <a:chOff x="0" y="0"/>
+          <a:chExt cx="0" cy="0"/>
+        </a:xfrm>
+      </p:grpSpPr>
+      <p:sp>
+        <p:nvSpPr>
+          <p:cNvPr id="96" name="TextShape 1"/>
+          <p:cNvSpPr txBox="1"/>
+          <p:nvPr/>
+        </p:nvSpPr>
+        <p:spPr>
+          <a:xfrm>
+            <a:off x="640080" y="1554480"/>
+            <a:ext cx="8961120" cy="1626120"/>
+          </a:xfrm>
+          <a:prstGeom prst="rect">
+            <a:avLst/>
+          </a:prstGeom>
+          <a:noFill/>
+          <a:ln>
+            <a:noFill/>
+          </a:ln>
+        </p:spPr>
+        <p:txBody>
+          <a:bodyPr lIns="90000" rIns="90000" tIns="45000" bIns="45000">
+            <a:spAutoFit/>
+          </a:bodyPr>
+          <a:p>
+            <a:r>
+              <a:rPr b="0" lang="en-US" sz="1800" spc="-1" strike="noStrike">
+                <a:latin typeface="Arial"/>
+              </a:rPr>
+              <a:t>Creating a database:</a:t>
+            </a:r>
+            <a:endParaRPr b="0" lang="en-US" sz="1800" spc="-1" strike="noStrike">
+              <a:latin typeface="Arial"/>
+            </a:endParaRPr>
+          </a:p>
+          <a:p>
+            <a:endParaRPr b="0" lang="en-US" sz="1800" spc="-1" strike="noStrike">
+              <a:latin typeface="Arial"/>
+            </a:endParaRPr>
+          </a:p>
+          <a:p>
+            <a:r>
+              <a:rPr b="0" lang="en-US" sz="1800" spc="-1" strike="noStrike">
+                <a:latin typeface="Arial"/>
+              </a:rPr>
+              <a:t>This is done by first adding SQL Server.</a:t>
+            </a:r>
+            <a:endParaRPr b="0" lang="en-US" sz="1800" spc="-1" strike="noStrike">
+              <a:latin typeface="Arial"/>
+            </a:endParaRPr>
+          </a:p>
+          <a:p>
+            <a:endParaRPr b="0" lang="en-US" sz="1800" spc="-1" strike="noStrike">
+              <a:latin typeface="Arial"/>
+            </a:endParaRPr>
+          </a:p>
+          <a:p>
+            <a:r>
+              <a:rPr b="0" lang="en-US" sz="1800" spc="-1" strike="noStrike">
+                <a:latin typeface="Arial"/>
+              </a:rPr>
+              <a:t>App.config file is generated, inside which the connection string is supposed to be entered, to establish the connection.</a:t>
+            </a:r>
+            <a:endParaRPr b="0" lang="en-US" sz="1800" spc="-1" strike="noStrike">
+              <a:latin typeface="Arial"/>
+            </a:endParaRPr>
+          </a:p>
+        </p:txBody>
+      </p:sp>
+      <p:pic>
+        <p:nvPicPr>
+          <p:cNvPr id="97" name="" descr=""/>
+          <p:cNvPicPr/>
+          <p:nvPr/>
+        </p:nvPicPr>
+        <p:blipFill>
+          <a:blip r:embed="rId1"/>
+          <a:stretch/>
+        </p:blipFill>
+        <p:spPr>
+          <a:xfrm>
+            <a:off x="446400" y="3383280"/>
+            <a:ext cx="9246240" cy="318240"/>
+          </a:xfrm>
+          <a:prstGeom prst="rect">
+            <a:avLst/>
+          </a:prstGeom>
+          <a:ln>
+            <a:noFill/>
+          </a:ln>
+        </p:spPr>
+      </p:pic>
     </p:spTree>
   </p:cSld>
   <mc:AlternateContent>

</xml_diff>